<commit_message>
Some Changes to ppt
</commit_message>
<xml_diff>
--- a/präsi.pptx
+++ b/präsi.pptx
@@ -529,30 +529,7 @@
           <a:bodyPr/>
           <a:lstStyle/>
           <a:p>
-            <a:r>
-              <a:rPr lang="de-DE" dirty="0"/>
-              <a:t>-Sehr abstrakte Sprache, wenn es etwas nicht gibt kann man es dazu schreiben</a:t>
-            </a:r>
-          </a:p>
-          <a:p>
-            <a:r>
-              <a:rPr lang="de-DE" dirty="0"/>
-              <a:t>-Hardware direkt ansprechbar</a:t>
-            </a:r>
-          </a:p>
-          <a:p>
-            <a:r>
-              <a:rPr lang="de-DE" dirty="0"/>
-              <a:t>-Viele verschiedene Sprachkonzepte enthalten (</a:t>
-            </a:r>
-            <a:r>
-              <a:rPr lang="de-DE" dirty="0" err="1"/>
-              <a:t>Templates,preprocessor,etc</a:t>
-            </a:r>
-            <a:r>
-              <a:rPr lang="de-DE" dirty="0"/>
-              <a:t>.)</a:t>
-            </a:r>
+            <a:endParaRPr lang="de-DE"/>
           </a:p>
         </p:txBody>
       </p:sp>
@@ -573,7 +550,7 @@
           <a:p>
             <a:fld id="{A36B5070-147E-453A-9D66-845762D79ED0}" type="slidenum">
               <a:rPr lang="de-DE" smtClean="0"/>
-              <a:t>2</a:t>
+              <a:t>1</a:t>
             </a:fld>
             <a:endParaRPr lang="de-DE"/>
           </a:p>
@@ -582,7 +559,847 @@
     </p:spTree>
     <p:extLst>
       <p:ext uri="{BB962C8B-B14F-4D97-AF65-F5344CB8AC3E}">
-        <p14:creationId xmlns:p14="http://schemas.microsoft.com/office/powerpoint/2010/main" val="3634697197"/>
+        <p14:creationId xmlns:p14="http://schemas.microsoft.com/office/powerpoint/2010/main" val="148294618"/>
+      </p:ext>
+    </p:extLst>
+  </p:cSld>
+  <p:clrMapOvr>
+    <a:masterClrMapping/>
+  </p:clrMapOvr>
+</p:notes>
+</file>
+
+<file path=ppt/notesSlides/notesSlide10.xml><?xml version="1.0" encoding="utf-8"?>
+<p:notes xmlns:a="http://schemas.openxmlformats.org/drawingml/2006/main" xmlns:r="http://schemas.openxmlformats.org/officeDocument/2006/relationships" xmlns:p="http://schemas.openxmlformats.org/presentationml/2006/main">
+  <p:cSld>
+    <p:spTree>
+      <p:nvGrpSpPr>
+        <p:cNvPr id="1" name=""/>
+        <p:cNvGrpSpPr/>
+        <p:nvPr/>
+      </p:nvGrpSpPr>
+      <p:grpSpPr>
+        <a:xfrm>
+          <a:off x="0" y="0"/>
+          <a:ext cx="0" cy="0"/>
+          <a:chOff x="0" y="0"/>
+          <a:chExt cx="0" cy="0"/>
+        </a:xfrm>
+      </p:grpSpPr>
+      <p:sp>
+        <p:nvSpPr>
+          <p:cNvPr id="2" name="Folienbildplatzhalter 1"/>
+          <p:cNvSpPr>
+            <a:spLocks noGrp="1" noRot="1" noChangeAspect="1"/>
+          </p:cNvSpPr>
+          <p:nvPr>
+            <p:ph type="sldImg"/>
+          </p:nvPr>
+        </p:nvSpPr>
+        <p:spPr/>
+      </p:sp>
+      <p:sp>
+        <p:nvSpPr>
+          <p:cNvPr id="3" name="Notizenplatzhalter 2"/>
+          <p:cNvSpPr>
+            <a:spLocks noGrp="1"/>
+          </p:cNvSpPr>
+          <p:nvPr>
+            <p:ph type="body" idx="1"/>
+          </p:nvPr>
+        </p:nvSpPr>
+        <p:spPr/>
+        <p:txBody>
+          <a:bodyPr/>
+          <a:lstStyle/>
+          <a:p>
+            <a:endParaRPr lang="de-DE"/>
+          </a:p>
+        </p:txBody>
+      </p:sp>
+      <p:sp>
+        <p:nvSpPr>
+          <p:cNvPr id="4" name="Foliennummernplatzhalter 3"/>
+          <p:cNvSpPr>
+            <a:spLocks noGrp="1"/>
+          </p:cNvSpPr>
+          <p:nvPr>
+            <p:ph type="sldNum" sz="quarter" idx="10"/>
+          </p:nvPr>
+        </p:nvSpPr>
+        <p:spPr/>
+        <p:txBody>
+          <a:bodyPr/>
+          <a:lstStyle/>
+          <a:p>
+            <a:fld id="{A36B5070-147E-453A-9D66-845762D79ED0}" type="slidenum">
+              <a:rPr lang="de-DE" smtClean="0"/>
+              <a:t>10</a:t>
+            </a:fld>
+            <a:endParaRPr lang="de-DE"/>
+          </a:p>
+        </p:txBody>
+      </p:sp>
+    </p:spTree>
+    <p:extLst>
+      <p:ext uri="{BB962C8B-B14F-4D97-AF65-F5344CB8AC3E}">
+        <p14:creationId xmlns:p14="http://schemas.microsoft.com/office/powerpoint/2010/main" val="1444419440"/>
+      </p:ext>
+    </p:extLst>
+  </p:cSld>
+  <p:clrMapOvr>
+    <a:masterClrMapping/>
+  </p:clrMapOvr>
+</p:notes>
+</file>
+
+<file path=ppt/notesSlides/notesSlide11.xml><?xml version="1.0" encoding="utf-8"?>
+<p:notes xmlns:a="http://schemas.openxmlformats.org/drawingml/2006/main" xmlns:r="http://schemas.openxmlformats.org/officeDocument/2006/relationships" xmlns:p="http://schemas.openxmlformats.org/presentationml/2006/main">
+  <p:cSld>
+    <p:spTree>
+      <p:nvGrpSpPr>
+        <p:cNvPr id="1" name=""/>
+        <p:cNvGrpSpPr/>
+        <p:nvPr/>
+      </p:nvGrpSpPr>
+      <p:grpSpPr>
+        <a:xfrm>
+          <a:off x="0" y="0"/>
+          <a:ext cx="0" cy="0"/>
+          <a:chOff x="0" y="0"/>
+          <a:chExt cx="0" cy="0"/>
+        </a:xfrm>
+      </p:grpSpPr>
+      <p:sp>
+        <p:nvSpPr>
+          <p:cNvPr id="2" name="Folienbildplatzhalter 1"/>
+          <p:cNvSpPr>
+            <a:spLocks noGrp="1" noRot="1" noChangeAspect="1"/>
+          </p:cNvSpPr>
+          <p:nvPr>
+            <p:ph type="sldImg"/>
+          </p:nvPr>
+        </p:nvSpPr>
+        <p:spPr/>
+      </p:sp>
+      <p:sp>
+        <p:nvSpPr>
+          <p:cNvPr id="3" name="Notizenplatzhalter 2"/>
+          <p:cNvSpPr>
+            <a:spLocks noGrp="1"/>
+          </p:cNvSpPr>
+          <p:nvPr>
+            <p:ph type="body" idx="1"/>
+          </p:nvPr>
+        </p:nvSpPr>
+        <p:spPr/>
+        <p:txBody>
+          <a:bodyPr/>
+          <a:lstStyle/>
+          <a:p>
+            <a:endParaRPr lang="de-DE"/>
+          </a:p>
+        </p:txBody>
+      </p:sp>
+      <p:sp>
+        <p:nvSpPr>
+          <p:cNvPr id="4" name="Foliennummernplatzhalter 3"/>
+          <p:cNvSpPr>
+            <a:spLocks noGrp="1"/>
+          </p:cNvSpPr>
+          <p:nvPr>
+            <p:ph type="sldNum" sz="quarter" idx="10"/>
+          </p:nvPr>
+        </p:nvSpPr>
+        <p:spPr/>
+        <p:txBody>
+          <a:bodyPr/>
+          <a:lstStyle/>
+          <a:p>
+            <a:fld id="{A36B5070-147E-453A-9D66-845762D79ED0}" type="slidenum">
+              <a:rPr lang="de-DE" smtClean="0"/>
+              <a:t>11</a:t>
+            </a:fld>
+            <a:endParaRPr lang="de-DE"/>
+          </a:p>
+        </p:txBody>
+      </p:sp>
+    </p:spTree>
+    <p:extLst>
+      <p:ext uri="{BB962C8B-B14F-4D97-AF65-F5344CB8AC3E}">
+        <p14:creationId xmlns:p14="http://schemas.microsoft.com/office/powerpoint/2010/main" val="2654308605"/>
+      </p:ext>
+    </p:extLst>
+  </p:cSld>
+  <p:clrMapOvr>
+    <a:masterClrMapping/>
+  </p:clrMapOvr>
+</p:notes>
+</file>
+
+<file path=ppt/notesSlides/notesSlide12.xml><?xml version="1.0" encoding="utf-8"?>
+<p:notes xmlns:a="http://schemas.openxmlformats.org/drawingml/2006/main" xmlns:r="http://schemas.openxmlformats.org/officeDocument/2006/relationships" xmlns:p="http://schemas.openxmlformats.org/presentationml/2006/main">
+  <p:cSld>
+    <p:spTree>
+      <p:nvGrpSpPr>
+        <p:cNvPr id="1" name=""/>
+        <p:cNvGrpSpPr/>
+        <p:nvPr/>
+      </p:nvGrpSpPr>
+      <p:grpSpPr>
+        <a:xfrm>
+          <a:off x="0" y="0"/>
+          <a:ext cx="0" cy="0"/>
+          <a:chOff x="0" y="0"/>
+          <a:chExt cx="0" cy="0"/>
+        </a:xfrm>
+      </p:grpSpPr>
+      <p:sp>
+        <p:nvSpPr>
+          <p:cNvPr id="2" name="Folienbildplatzhalter 1"/>
+          <p:cNvSpPr>
+            <a:spLocks noGrp="1" noRot="1" noChangeAspect="1"/>
+          </p:cNvSpPr>
+          <p:nvPr>
+            <p:ph type="sldImg"/>
+          </p:nvPr>
+        </p:nvSpPr>
+        <p:spPr/>
+      </p:sp>
+      <p:sp>
+        <p:nvSpPr>
+          <p:cNvPr id="3" name="Notizenplatzhalter 2"/>
+          <p:cNvSpPr>
+            <a:spLocks noGrp="1"/>
+          </p:cNvSpPr>
+          <p:nvPr>
+            <p:ph type="body" idx="1"/>
+          </p:nvPr>
+        </p:nvSpPr>
+        <p:spPr/>
+        <p:txBody>
+          <a:bodyPr/>
+          <a:lstStyle/>
+          <a:p>
+            <a:endParaRPr lang="de-DE"/>
+          </a:p>
+        </p:txBody>
+      </p:sp>
+      <p:sp>
+        <p:nvSpPr>
+          <p:cNvPr id="4" name="Foliennummernplatzhalter 3"/>
+          <p:cNvSpPr>
+            <a:spLocks noGrp="1"/>
+          </p:cNvSpPr>
+          <p:nvPr>
+            <p:ph type="sldNum" sz="quarter" idx="10"/>
+          </p:nvPr>
+        </p:nvSpPr>
+        <p:spPr/>
+        <p:txBody>
+          <a:bodyPr/>
+          <a:lstStyle/>
+          <a:p>
+            <a:fld id="{A36B5070-147E-453A-9D66-845762D79ED0}" type="slidenum">
+              <a:rPr lang="de-DE" smtClean="0"/>
+              <a:t>12</a:t>
+            </a:fld>
+            <a:endParaRPr lang="de-DE"/>
+          </a:p>
+        </p:txBody>
+      </p:sp>
+    </p:spTree>
+    <p:extLst>
+      <p:ext uri="{BB962C8B-B14F-4D97-AF65-F5344CB8AC3E}">
+        <p14:creationId xmlns:p14="http://schemas.microsoft.com/office/powerpoint/2010/main" val="3824090169"/>
+      </p:ext>
+    </p:extLst>
+  </p:cSld>
+  <p:clrMapOvr>
+    <a:masterClrMapping/>
+  </p:clrMapOvr>
+</p:notes>
+</file>
+
+<file path=ppt/notesSlides/notesSlide13.xml><?xml version="1.0" encoding="utf-8"?>
+<p:notes xmlns:a="http://schemas.openxmlformats.org/drawingml/2006/main" xmlns:r="http://schemas.openxmlformats.org/officeDocument/2006/relationships" xmlns:p="http://schemas.openxmlformats.org/presentationml/2006/main">
+  <p:cSld>
+    <p:spTree>
+      <p:nvGrpSpPr>
+        <p:cNvPr id="1" name=""/>
+        <p:cNvGrpSpPr/>
+        <p:nvPr/>
+      </p:nvGrpSpPr>
+      <p:grpSpPr>
+        <a:xfrm>
+          <a:off x="0" y="0"/>
+          <a:ext cx="0" cy="0"/>
+          <a:chOff x="0" y="0"/>
+          <a:chExt cx="0" cy="0"/>
+        </a:xfrm>
+      </p:grpSpPr>
+      <p:sp>
+        <p:nvSpPr>
+          <p:cNvPr id="2" name="Folienbildplatzhalter 1"/>
+          <p:cNvSpPr>
+            <a:spLocks noGrp="1" noRot="1" noChangeAspect="1"/>
+          </p:cNvSpPr>
+          <p:nvPr>
+            <p:ph type="sldImg"/>
+          </p:nvPr>
+        </p:nvSpPr>
+        <p:spPr/>
+      </p:sp>
+      <p:sp>
+        <p:nvSpPr>
+          <p:cNvPr id="3" name="Notizenplatzhalter 2"/>
+          <p:cNvSpPr>
+            <a:spLocks noGrp="1"/>
+          </p:cNvSpPr>
+          <p:nvPr>
+            <p:ph type="body" idx="1"/>
+          </p:nvPr>
+        </p:nvSpPr>
+        <p:spPr/>
+        <p:txBody>
+          <a:bodyPr/>
+          <a:lstStyle/>
+          <a:p>
+            <a:endParaRPr lang="de-DE"/>
+          </a:p>
+        </p:txBody>
+      </p:sp>
+      <p:sp>
+        <p:nvSpPr>
+          <p:cNvPr id="4" name="Foliennummernplatzhalter 3"/>
+          <p:cNvSpPr>
+            <a:spLocks noGrp="1"/>
+          </p:cNvSpPr>
+          <p:nvPr>
+            <p:ph type="sldNum" sz="quarter" idx="10"/>
+          </p:nvPr>
+        </p:nvSpPr>
+        <p:spPr/>
+        <p:txBody>
+          <a:bodyPr/>
+          <a:lstStyle/>
+          <a:p>
+            <a:fld id="{A36B5070-147E-453A-9D66-845762D79ED0}" type="slidenum">
+              <a:rPr lang="de-DE" smtClean="0"/>
+              <a:t>13</a:t>
+            </a:fld>
+            <a:endParaRPr lang="de-DE"/>
+          </a:p>
+        </p:txBody>
+      </p:sp>
+    </p:spTree>
+    <p:extLst>
+      <p:ext uri="{BB962C8B-B14F-4D97-AF65-F5344CB8AC3E}">
+        <p14:creationId xmlns:p14="http://schemas.microsoft.com/office/powerpoint/2010/main" val="180274757"/>
+      </p:ext>
+    </p:extLst>
+  </p:cSld>
+  <p:clrMapOvr>
+    <a:masterClrMapping/>
+  </p:clrMapOvr>
+</p:notes>
+</file>
+
+<file path=ppt/notesSlides/notesSlide14.xml><?xml version="1.0" encoding="utf-8"?>
+<p:notes xmlns:a="http://schemas.openxmlformats.org/drawingml/2006/main" xmlns:r="http://schemas.openxmlformats.org/officeDocument/2006/relationships" xmlns:p="http://schemas.openxmlformats.org/presentationml/2006/main">
+  <p:cSld>
+    <p:spTree>
+      <p:nvGrpSpPr>
+        <p:cNvPr id="1" name=""/>
+        <p:cNvGrpSpPr/>
+        <p:nvPr/>
+      </p:nvGrpSpPr>
+      <p:grpSpPr>
+        <a:xfrm>
+          <a:off x="0" y="0"/>
+          <a:ext cx="0" cy="0"/>
+          <a:chOff x="0" y="0"/>
+          <a:chExt cx="0" cy="0"/>
+        </a:xfrm>
+      </p:grpSpPr>
+      <p:sp>
+        <p:nvSpPr>
+          <p:cNvPr id="2" name="Folienbildplatzhalter 1"/>
+          <p:cNvSpPr>
+            <a:spLocks noGrp="1" noRot="1" noChangeAspect="1"/>
+          </p:cNvSpPr>
+          <p:nvPr>
+            <p:ph type="sldImg"/>
+          </p:nvPr>
+        </p:nvSpPr>
+        <p:spPr/>
+      </p:sp>
+      <p:sp>
+        <p:nvSpPr>
+          <p:cNvPr id="3" name="Notizenplatzhalter 2"/>
+          <p:cNvSpPr>
+            <a:spLocks noGrp="1"/>
+          </p:cNvSpPr>
+          <p:nvPr>
+            <p:ph type="body" idx="1"/>
+          </p:nvPr>
+        </p:nvSpPr>
+        <p:spPr/>
+        <p:txBody>
+          <a:bodyPr/>
+          <a:lstStyle/>
+          <a:p>
+            <a:endParaRPr lang="de-DE"/>
+          </a:p>
+        </p:txBody>
+      </p:sp>
+      <p:sp>
+        <p:nvSpPr>
+          <p:cNvPr id="4" name="Foliennummernplatzhalter 3"/>
+          <p:cNvSpPr>
+            <a:spLocks noGrp="1"/>
+          </p:cNvSpPr>
+          <p:nvPr>
+            <p:ph type="sldNum" sz="quarter" idx="10"/>
+          </p:nvPr>
+        </p:nvSpPr>
+        <p:spPr/>
+        <p:txBody>
+          <a:bodyPr/>
+          <a:lstStyle/>
+          <a:p>
+            <a:fld id="{A36B5070-147E-453A-9D66-845762D79ED0}" type="slidenum">
+              <a:rPr lang="de-DE" smtClean="0"/>
+              <a:t>14</a:t>
+            </a:fld>
+            <a:endParaRPr lang="de-DE"/>
+          </a:p>
+        </p:txBody>
+      </p:sp>
+    </p:spTree>
+    <p:extLst>
+      <p:ext uri="{BB962C8B-B14F-4D97-AF65-F5344CB8AC3E}">
+        <p14:creationId xmlns:p14="http://schemas.microsoft.com/office/powerpoint/2010/main" val="1902177289"/>
+      </p:ext>
+    </p:extLst>
+  </p:cSld>
+  <p:clrMapOvr>
+    <a:masterClrMapping/>
+  </p:clrMapOvr>
+</p:notes>
+</file>
+
+<file path=ppt/notesSlides/notesSlide15.xml><?xml version="1.0" encoding="utf-8"?>
+<p:notes xmlns:a="http://schemas.openxmlformats.org/drawingml/2006/main" xmlns:r="http://schemas.openxmlformats.org/officeDocument/2006/relationships" xmlns:p="http://schemas.openxmlformats.org/presentationml/2006/main">
+  <p:cSld>
+    <p:spTree>
+      <p:nvGrpSpPr>
+        <p:cNvPr id="1" name=""/>
+        <p:cNvGrpSpPr/>
+        <p:nvPr/>
+      </p:nvGrpSpPr>
+      <p:grpSpPr>
+        <a:xfrm>
+          <a:off x="0" y="0"/>
+          <a:ext cx="0" cy="0"/>
+          <a:chOff x="0" y="0"/>
+          <a:chExt cx="0" cy="0"/>
+        </a:xfrm>
+      </p:grpSpPr>
+      <p:sp>
+        <p:nvSpPr>
+          <p:cNvPr id="2" name="Folienbildplatzhalter 1"/>
+          <p:cNvSpPr>
+            <a:spLocks noGrp="1" noRot="1" noChangeAspect="1"/>
+          </p:cNvSpPr>
+          <p:nvPr>
+            <p:ph type="sldImg"/>
+          </p:nvPr>
+        </p:nvSpPr>
+        <p:spPr/>
+      </p:sp>
+      <p:sp>
+        <p:nvSpPr>
+          <p:cNvPr id="3" name="Notizenplatzhalter 2"/>
+          <p:cNvSpPr>
+            <a:spLocks noGrp="1"/>
+          </p:cNvSpPr>
+          <p:nvPr>
+            <p:ph type="body" idx="1"/>
+          </p:nvPr>
+        </p:nvSpPr>
+        <p:spPr/>
+        <p:txBody>
+          <a:bodyPr/>
+          <a:lstStyle/>
+          <a:p>
+            <a:endParaRPr lang="de-DE"/>
+          </a:p>
+        </p:txBody>
+      </p:sp>
+      <p:sp>
+        <p:nvSpPr>
+          <p:cNvPr id="4" name="Foliennummernplatzhalter 3"/>
+          <p:cNvSpPr>
+            <a:spLocks noGrp="1"/>
+          </p:cNvSpPr>
+          <p:nvPr>
+            <p:ph type="sldNum" sz="quarter" idx="10"/>
+          </p:nvPr>
+        </p:nvSpPr>
+        <p:spPr/>
+        <p:txBody>
+          <a:bodyPr/>
+          <a:lstStyle/>
+          <a:p>
+            <a:fld id="{A36B5070-147E-453A-9D66-845762D79ED0}" type="slidenum">
+              <a:rPr lang="de-DE" smtClean="0"/>
+              <a:t>15</a:t>
+            </a:fld>
+            <a:endParaRPr lang="de-DE"/>
+          </a:p>
+        </p:txBody>
+      </p:sp>
+    </p:spTree>
+    <p:extLst>
+      <p:ext uri="{BB962C8B-B14F-4D97-AF65-F5344CB8AC3E}">
+        <p14:creationId xmlns:p14="http://schemas.microsoft.com/office/powerpoint/2010/main" val="2513844918"/>
+      </p:ext>
+    </p:extLst>
+  </p:cSld>
+  <p:clrMapOvr>
+    <a:masterClrMapping/>
+  </p:clrMapOvr>
+</p:notes>
+</file>
+
+<file path=ppt/notesSlides/notesSlide16.xml><?xml version="1.0" encoding="utf-8"?>
+<p:notes xmlns:a="http://schemas.openxmlformats.org/drawingml/2006/main" xmlns:r="http://schemas.openxmlformats.org/officeDocument/2006/relationships" xmlns:p="http://schemas.openxmlformats.org/presentationml/2006/main">
+  <p:cSld>
+    <p:spTree>
+      <p:nvGrpSpPr>
+        <p:cNvPr id="1" name=""/>
+        <p:cNvGrpSpPr/>
+        <p:nvPr/>
+      </p:nvGrpSpPr>
+      <p:grpSpPr>
+        <a:xfrm>
+          <a:off x="0" y="0"/>
+          <a:ext cx="0" cy="0"/>
+          <a:chOff x="0" y="0"/>
+          <a:chExt cx="0" cy="0"/>
+        </a:xfrm>
+      </p:grpSpPr>
+      <p:sp>
+        <p:nvSpPr>
+          <p:cNvPr id="2" name="Folienbildplatzhalter 1"/>
+          <p:cNvSpPr>
+            <a:spLocks noGrp="1" noRot="1" noChangeAspect="1"/>
+          </p:cNvSpPr>
+          <p:nvPr>
+            <p:ph type="sldImg"/>
+          </p:nvPr>
+        </p:nvSpPr>
+        <p:spPr/>
+      </p:sp>
+      <p:sp>
+        <p:nvSpPr>
+          <p:cNvPr id="3" name="Notizenplatzhalter 2"/>
+          <p:cNvSpPr>
+            <a:spLocks noGrp="1"/>
+          </p:cNvSpPr>
+          <p:nvPr>
+            <p:ph type="body" idx="1"/>
+          </p:nvPr>
+        </p:nvSpPr>
+        <p:spPr/>
+        <p:txBody>
+          <a:bodyPr/>
+          <a:lstStyle/>
+          <a:p>
+            <a:endParaRPr lang="de-DE"/>
+          </a:p>
+        </p:txBody>
+      </p:sp>
+      <p:sp>
+        <p:nvSpPr>
+          <p:cNvPr id="4" name="Foliennummernplatzhalter 3"/>
+          <p:cNvSpPr>
+            <a:spLocks noGrp="1"/>
+          </p:cNvSpPr>
+          <p:nvPr>
+            <p:ph type="sldNum" sz="quarter" idx="10"/>
+          </p:nvPr>
+        </p:nvSpPr>
+        <p:spPr/>
+        <p:txBody>
+          <a:bodyPr/>
+          <a:lstStyle/>
+          <a:p>
+            <a:fld id="{A36B5070-147E-453A-9D66-845762D79ED0}" type="slidenum">
+              <a:rPr lang="de-DE" smtClean="0"/>
+              <a:t>16</a:t>
+            </a:fld>
+            <a:endParaRPr lang="de-DE"/>
+          </a:p>
+        </p:txBody>
+      </p:sp>
+    </p:spTree>
+    <p:extLst>
+      <p:ext uri="{BB962C8B-B14F-4D97-AF65-F5344CB8AC3E}">
+        <p14:creationId xmlns:p14="http://schemas.microsoft.com/office/powerpoint/2010/main" val="1913503462"/>
+      </p:ext>
+    </p:extLst>
+  </p:cSld>
+  <p:clrMapOvr>
+    <a:masterClrMapping/>
+  </p:clrMapOvr>
+</p:notes>
+</file>
+
+<file path=ppt/notesSlides/notesSlide17.xml><?xml version="1.0" encoding="utf-8"?>
+<p:notes xmlns:a="http://schemas.openxmlformats.org/drawingml/2006/main" xmlns:r="http://schemas.openxmlformats.org/officeDocument/2006/relationships" xmlns:p="http://schemas.openxmlformats.org/presentationml/2006/main">
+  <p:cSld>
+    <p:spTree>
+      <p:nvGrpSpPr>
+        <p:cNvPr id="1" name=""/>
+        <p:cNvGrpSpPr/>
+        <p:nvPr/>
+      </p:nvGrpSpPr>
+      <p:grpSpPr>
+        <a:xfrm>
+          <a:off x="0" y="0"/>
+          <a:ext cx="0" cy="0"/>
+          <a:chOff x="0" y="0"/>
+          <a:chExt cx="0" cy="0"/>
+        </a:xfrm>
+      </p:grpSpPr>
+      <p:sp>
+        <p:nvSpPr>
+          <p:cNvPr id="2" name="Folienbildplatzhalter 1"/>
+          <p:cNvSpPr>
+            <a:spLocks noGrp="1" noRot="1" noChangeAspect="1"/>
+          </p:cNvSpPr>
+          <p:nvPr>
+            <p:ph type="sldImg"/>
+          </p:nvPr>
+        </p:nvSpPr>
+        <p:spPr/>
+      </p:sp>
+      <p:sp>
+        <p:nvSpPr>
+          <p:cNvPr id="3" name="Notizenplatzhalter 2"/>
+          <p:cNvSpPr>
+            <a:spLocks noGrp="1"/>
+          </p:cNvSpPr>
+          <p:nvPr>
+            <p:ph type="body" idx="1"/>
+          </p:nvPr>
+        </p:nvSpPr>
+        <p:spPr/>
+        <p:txBody>
+          <a:bodyPr/>
+          <a:lstStyle/>
+          <a:p>
+            <a:endParaRPr lang="de-DE"/>
+          </a:p>
+        </p:txBody>
+      </p:sp>
+      <p:sp>
+        <p:nvSpPr>
+          <p:cNvPr id="4" name="Foliennummernplatzhalter 3"/>
+          <p:cNvSpPr>
+            <a:spLocks noGrp="1"/>
+          </p:cNvSpPr>
+          <p:nvPr>
+            <p:ph type="sldNum" sz="quarter" idx="10"/>
+          </p:nvPr>
+        </p:nvSpPr>
+        <p:spPr/>
+        <p:txBody>
+          <a:bodyPr/>
+          <a:lstStyle/>
+          <a:p>
+            <a:fld id="{A36B5070-147E-453A-9D66-845762D79ED0}" type="slidenum">
+              <a:rPr lang="de-DE" smtClean="0"/>
+              <a:t>17</a:t>
+            </a:fld>
+            <a:endParaRPr lang="de-DE"/>
+          </a:p>
+        </p:txBody>
+      </p:sp>
+    </p:spTree>
+    <p:extLst>
+      <p:ext uri="{BB962C8B-B14F-4D97-AF65-F5344CB8AC3E}">
+        <p14:creationId xmlns:p14="http://schemas.microsoft.com/office/powerpoint/2010/main" val="3406235661"/>
+      </p:ext>
+    </p:extLst>
+  </p:cSld>
+  <p:clrMapOvr>
+    <a:masterClrMapping/>
+  </p:clrMapOvr>
+</p:notes>
+</file>
+
+<file path=ppt/notesSlides/notesSlide18.xml><?xml version="1.0" encoding="utf-8"?>
+<p:notes xmlns:a="http://schemas.openxmlformats.org/drawingml/2006/main" xmlns:r="http://schemas.openxmlformats.org/officeDocument/2006/relationships" xmlns:p="http://schemas.openxmlformats.org/presentationml/2006/main">
+  <p:cSld>
+    <p:spTree>
+      <p:nvGrpSpPr>
+        <p:cNvPr id="1" name=""/>
+        <p:cNvGrpSpPr/>
+        <p:nvPr/>
+      </p:nvGrpSpPr>
+      <p:grpSpPr>
+        <a:xfrm>
+          <a:off x="0" y="0"/>
+          <a:ext cx="0" cy="0"/>
+          <a:chOff x="0" y="0"/>
+          <a:chExt cx="0" cy="0"/>
+        </a:xfrm>
+      </p:grpSpPr>
+      <p:sp>
+        <p:nvSpPr>
+          <p:cNvPr id="2" name="Folienbildplatzhalter 1"/>
+          <p:cNvSpPr>
+            <a:spLocks noGrp="1" noRot="1" noChangeAspect="1"/>
+          </p:cNvSpPr>
+          <p:nvPr>
+            <p:ph type="sldImg"/>
+          </p:nvPr>
+        </p:nvSpPr>
+        <p:spPr/>
+      </p:sp>
+      <p:sp>
+        <p:nvSpPr>
+          <p:cNvPr id="3" name="Notizenplatzhalter 2"/>
+          <p:cNvSpPr>
+            <a:spLocks noGrp="1"/>
+          </p:cNvSpPr>
+          <p:nvPr>
+            <p:ph type="body" idx="1"/>
+          </p:nvPr>
+        </p:nvSpPr>
+        <p:spPr/>
+        <p:txBody>
+          <a:bodyPr/>
+          <a:lstStyle/>
+          <a:p>
+            <a:endParaRPr lang="de-DE"/>
+          </a:p>
+        </p:txBody>
+      </p:sp>
+      <p:sp>
+        <p:nvSpPr>
+          <p:cNvPr id="4" name="Foliennummernplatzhalter 3"/>
+          <p:cNvSpPr>
+            <a:spLocks noGrp="1"/>
+          </p:cNvSpPr>
+          <p:nvPr>
+            <p:ph type="sldNum" sz="quarter" idx="10"/>
+          </p:nvPr>
+        </p:nvSpPr>
+        <p:spPr/>
+        <p:txBody>
+          <a:bodyPr/>
+          <a:lstStyle/>
+          <a:p>
+            <a:fld id="{A36B5070-147E-453A-9D66-845762D79ED0}" type="slidenum">
+              <a:rPr lang="de-DE" smtClean="0"/>
+              <a:t>18</a:t>
+            </a:fld>
+            <a:endParaRPr lang="de-DE"/>
+          </a:p>
+        </p:txBody>
+      </p:sp>
+    </p:spTree>
+    <p:extLst>
+      <p:ext uri="{BB962C8B-B14F-4D97-AF65-F5344CB8AC3E}">
+        <p14:creationId xmlns:p14="http://schemas.microsoft.com/office/powerpoint/2010/main" val="2905253427"/>
+      </p:ext>
+    </p:extLst>
+  </p:cSld>
+  <p:clrMapOvr>
+    <a:masterClrMapping/>
+  </p:clrMapOvr>
+</p:notes>
+</file>
+
+<file path=ppt/notesSlides/notesSlide19.xml><?xml version="1.0" encoding="utf-8"?>
+<p:notes xmlns:a="http://schemas.openxmlformats.org/drawingml/2006/main" xmlns:r="http://schemas.openxmlformats.org/officeDocument/2006/relationships" xmlns:p="http://schemas.openxmlformats.org/presentationml/2006/main">
+  <p:cSld>
+    <p:spTree>
+      <p:nvGrpSpPr>
+        <p:cNvPr id="1" name=""/>
+        <p:cNvGrpSpPr/>
+        <p:nvPr/>
+      </p:nvGrpSpPr>
+      <p:grpSpPr>
+        <a:xfrm>
+          <a:off x="0" y="0"/>
+          <a:ext cx="0" cy="0"/>
+          <a:chOff x="0" y="0"/>
+          <a:chExt cx="0" cy="0"/>
+        </a:xfrm>
+      </p:grpSpPr>
+      <p:sp>
+        <p:nvSpPr>
+          <p:cNvPr id="2" name="Folienbildplatzhalter 1"/>
+          <p:cNvSpPr>
+            <a:spLocks noGrp="1" noRot="1" noChangeAspect="1"/>
+          </p:cNvSpPr>
+          <p:nvPr>
+            <p:ph type="sldImg"/>
+          </p:nvPr>
+        </p:nvSpPr>
+        <p:spPr/>
+      </p:sp>
+      <p:sp>
+        <p:nvSpPr>
+          <p:cNvPr id="3" name="Notizenplatzhalter 2"/>
+          <p:cNvSpPr>
+            <a:spLocks noGrp="1"/>
+          </p:cNvSpPr>
+          <p:nvPr>
+            <p:ph type="body" idx="1"/>
+          </p:nvPr>
+        </p:nvSpPr>
+        <p:spPr/>
+        <p:txBody>
+          <a:bodyPr/>
+          <a:lstStyle/>
+          <a:p>
+            <a:endParaRPr lang="de-DE"/>
+          </a:p>
+        </p:txBody>
+      </p:sp>
+      <p:sp>
+        <p:nvSpPr>
+          <p:cNvPr id="4" name="Foliennummernplatzhalter 3"/>
+          <p:cNvSpPr>
+            <a:spLocks noGrp="1"/>
+          </p:cNvSpPr>
+          <p:nvPr>
+            <p:ph type="sldNum" sz="quarter" idx="10"/>
+          </p:nvPr>
+        </p:nvSpPr>
+        <p:spPr/>
+        <p:txBody>
+          <a:bodyPr/>
+          <a:lstStyle/>
+          <a:p>
+            <a:fld id="{A36B5070-147E-453A-9D66-845762D79ED0}" type="slidenum">
+              <a:rPr lang="de-DE" smtClean="0"/>
+              <a:t>19</a:t>
+            </a:fld>
+            <a:endParaRPr lang="de-DE"/>
+          </a:p>
+        </p:txBody>
+      </p:sp>
+    </p:spTree>
+    <p:extLst>
+      <p:ext uri="{BB962C8B-B14F-4D97-AF65-F5344CB8AC3E}">
+        <p14:creationId xmlns:p14="http://schemas.microsoft.com/office/powerpoint/2010/main" val="4287349883"/>
       </p:ext>
     </p:extLst>
   </p:cSld>
@@ -638,67 +1455,27 @@
           <a:p>
             <a:r>
               <a:rPr lang="de-DE" dirty="0"/>
-              <a:t>-</a:t>
+              <a:t>-Sehr abstrakte Sprache, wenn es etwas nicht gibt kann man es dazu schreiben</a:t>
+            </a:r>
+          </a:p>
+          <a:p>
+            <a:r>
+              <a:rPr lang="de-DE" dirty="0"/>
+              <a:t>-Hardware direkt ansprechbar</a:t>
+            </a:r>
+          </a:p>
+          <a:p>
+            <a:r>
+              <a:rPr lang="de-DE" dirty="0"/>
+              <a:t>-Viele verschiedene Sprachkonzepte enthalten (</a:t>
             </a:r>
             <a:r>
               <a:rPr lang="de-DE" dirty="0" err="1"/>
-              <a:t>Hanging</a:t>
+              <a:t>Templates,preprocessor,etc</a:t>
             </a:r>
             <a:r>
               <a:rPr lang="de-DE" dirty="0"/>
-              <a:t> Pointer</a:t>
-            </a:r>
-          </a:p>
-          <a:p>
-            <a:r>
-              <a:rPr lang="de-DE" dirty="0"/>
-              <a:t>-Memory </a:t>
-            </a:r>
-            <a:r>
-              <a:rPr lang="de-DE" dirty="0" err="1"/>
-              <a:t>Leak</a:t>
-            </a:r>
-            <a:endParaRPr lang="de-DE" dirty="0"/>
-          </a:p>
-          <a:p>
-            <a:r>
-              <a:rPr lang="de-DE" dirty="0"/>
-              <a:t>-impliziertes </a:t>
-            </a:r>
-            <a:r>
-              <a:rPr lang="de-DE" dirty="0" err="1"/>
-              <a:t>casten</a:t>
-            </a:r>
-            <a:endParaRPr lang="de-DE" dirty="0"/>
-          </a:p>
-          <a:p>
-            <a:r>
-              <a:rPr lang="de-DE" dirty="0"/>
-              <a:t>-keine </a:t>
-            </a:r>
-            <a:r>
-              <a:rPr lang="de-DE" dirty="0" err="1"/>
-              <a:t>übeprüfung</a:t>
-            </a:r>
-            <a:r>
-              <a:rPr lang="de-DE" dirty="0"/>
-              <a:t> ob auf </a:t>
-            </a:r>
-            <a:r>
-              <a:rPr lang="de-DE" dirty="0" err="1"/>
-              <a:t>größe</a:t>
-            </a:r>
-            <a:r>
-              <a:rPr lang="de-DE" dirty="0"/>
-              <a:t> von </a:t>
-            </a:r>
-            <a:r>
-              <a:rPr lang="de-DE" dirty="0" err="1"/>
-              <a:t>containern</a:t>
-            </a:r>
-            <a:r>
-              <a:rPr lang="de-DE" dirty="0"/>
-              <a:t> etc.</a:t>
+              <a:t>.)</a:t>
             </a:r>
           </a:p>
         </p:txBody>
@@ -720,7 +1497,7 @@
           <a:p>
             <a:fld id="{A36B5070-147E-453A-9D66-845762D79ED0}" type="slidenum">
               <a:rPr lang="de-DE" smtClean="0"/>
-              <a:t>3</a:t>
+              <a:t>2</a:t>
             </a:fld>
             <a:endParaRPr lang="de-DE"/>
           </a:p>
@@ -729,7 +1506,175 @@
     </p:spTree>
     <p:extLst>
       <p:ext uri="{BB962C8B-B14F-4D97-AF65-F5344CB8AC3E}">
-        <p14:creationId xmlns:p14="http://schemas.microsoft.com/office/powerpoint/2010/main" val="2776674935"/>
+        <p14:creationId xmlns:p14="http://schemas.microsoft.com/office/powerpoint/2010/main" val="3634697197"/>
+      </p:ext>
+    </p:extLst>
+  </p:cSld>
+  <p:clrMapOvr>
+    <a:masterClrMapping/>
+  </p:clrMapOvr>
+</p:notes>
+</file>
+
+<file path=ppt/notesSlides/notesSlide20.xml><?xml version="1.0" encoding="utf-8"?>
+<p:notes xmlns:a="http://schemas.openxmlformats.org/drawingml/2006/main" xmlns:r="http://schemas.openxmlformats.org/officeDocument/2006/relationships" xmlns:p="http://schemas.openxmlformats.org/presentationml/2006/main">
+  <p:cSld>
+    <p:spTree>
+      <p:nvGrpSpPr>
+        <p:cNvPr id="1" name=""/>
+        <p:cNvGrpSpPr/>
+        <p:nvPr/>
+      </p:nvGrpSpPr>
+      <p:grpSpPr>
+        <a:xfrm>
+          <a:off x="0" y="0"/>
+          <a:ext cx="0" cy="0"/>
+          <a:chOff x="0" y="0"/>
+          <a:chExt cx="0" cy="0"/>
+        </a:xfrm>
+      </p:grpSpPr>
+      <p:sp>
+        <p:nvSpPr>
+          <p:cNvPr id="2" name="Folienbildplatzhalter 1"/>
+          <p:cNvSpPr>
+            <a:spLocks noGrp="1" noRot="1" noChangeAspect="1"/>
+          </p:cNvSpPr>
+          <p:nvPr>
+            <p:ph type="sldImg"/>
+          </p:nvPr>
+        </p:nvSpPr>
+        <p:spPr/>
+      </p:sp>
+      <p:sp>
+        <p:nvSpPr>
+          <p:cNvPr id="3" name="Notizenplatzhalter 2"/>
+          <p:cNvSpPr>
+            <a:spLocks noGrp="1"/>
+          </p:cNvSpPr>
+          <p:nvPr>
+            <p:ph type="body" idx="1"/>
+          </p:nvPr>
+        </p:nvSpPr>
+        <p:spPr/>
+        <p:txBody>
+          <a:bodyPr/>
+          <a:lstStyle/>
+          <a:p>
+            <a:endParaRPr lang="de-DE"/>
+          </a:p>
+        </p:txBody>
+      </p:sp>
+      <p:sp>
+        <p:nvSpPr>
+          <p:cNvPr id="4" name="Foliennummernplatzhalter 3"/>
+          <p:cNvSpPr>
+            <a:spLocks noGrp="1"/>
+          </p:cNvSpPr>
+          <p:nvPr>
+            <p:ph type="sldNum" sz="quarter" idx="10"/>
+          </p:nvPr>
+        </p:nvSpPr>
+        <p:spPr/>
+        <p:txBody>
+          <a:bodyPr/>
+          <a:lstStyle/>
+          <a:p>
+            <a:fld id="{A36B5070-147E-453A-9D66-845762D79ED0}" type="slidenum">
+              <a:rPr lang="de-DE" smtClean="0"/>
+              <a:t>20</a:t>
+            </a:fld>
+            <a:endParaRPr lang="de-DE"/>
+          </a:p>
+        </p:txBody>
+      </p:sp>
+    </p:spTree>
+    <p:extLst>
+      <p:ext uri="{BB962C8B-B14F-4D97-AF65-F5344CB8AC3E}">
+        <p14:creationId xmlns:p14="http://schemas.microsoft.com/office/powerpoint/2010/main" val="3799649357"/>
+      </p:ext>
+    </p:extLst>
+  </p:cSld>
+  <p:clrMapOvr>
+    <a:masterClrMapping/>
+  </p:clrMapOvr>
+</p:notes>
+</file>
+
+<file path=ppt/notesSlides/notesSlide21.xml><?xml version="1.0" encoding="utf-8"?>
+<p:notes xmlns:a="http://schemas.openxmlformats.org/drawingml/2006/main" xmlns:r="http://schemas.openxmlformats.org/officeDocument/2006/relationships" xmlns:p="http://schemas.openxmlformats.org/presentationml/2006/main">
+  <p:cSld>
+    <p:spTree>
+      <p:nvGrpSpPr>
+        <p:cNvPr id="1" name=""/>
+        <p:cNvGrpSpPr/>
+        <p:nvPr/>
+      </p:nvGrpSpPr>
+      <p:grpSpPr>
+        <a:xfrm>
+          <a:off x="0" y="0"/>
+          <a:ext cx="0" cy="0"/>
+          <a:chOff x="0" y="0"/>
+          <a:chExt cx="0" cy="0"/>
+        </a:xfrm>
+      </p:grpSpPr>
+      <p:sp>
+        <p:nvSpPr>
+          <p:cNvPr id="2" name="Folienbildplatzhalter 1"/>
+          <p:cNvSpPr>
+            <a:spLocks noGrp="1" noRot="1" noChangeAspect="1"/>
+          </p:cNvSpPr>
+          <p:nvPr>
+            <p:ph type="sldImg"/>
+          </p:nvPr>
+        </p:nvSpPr>
+        <p:spPr/>
+      </p:sp>
+      <p:sp>
+        <p:nvSpPr>
+          <p:cNvPr id="3" name="Notizenplatzhalter 2"/>
+          <p:cNvSpPr>
+            <a:spLocks noGrp="1"/>
+          </p:cNvSpPr>
+          <p:nvPr>
+            <p:ph type="body" idx="1"/>
+          </p:nvPr>
+        </p:nvSpPr>
+        <p:spPr/>
+        <p:txBody>
+          <a:bodyPr/>
+          <a:lstStyle/>
+          <a:p>
+            <a:endParaRPr lang="de-DE"/>
+          </a:p>
+        </p:txBody>
+      </p:sp>
+      <p:sp>
+        <p:nvSpPr>
+          <p:cNvPr id="4" name="Foliennummernplatzhalter 3"/>
+          <p:cNvSpPr>
+            <a:spLocks noGrp="1"/>
+          </p:cNvSpPr>
+          <p:nvPr>
+            <p:ph type="sldNum" sz="quarter" idx="10"/>
+          </p:nvPr>
+        </p:nvSpPr>
+        <p:spPr/>
+        <p:txBody>
+          <a:bodyPr/>
+          <a:lstStyle/>
+          <a:p>
+            <a:fld id="{A36B5070-147E-453A-9D66-845762D79ED0}" type="slidenum">
+              <a:rPr lang="de-DE" smtClean="0"/>
+              <a:t>21</a:t>
+            </a:fld>
+            <a:endParaRPr lang="de-DE"/>
+          </a:p>
+        </p:txBody>
+      </p:sp>
+    </p:spTree>
+    <p:extLst>
+      <p:ext uri="{BB962C8B-B14F-4D97-AF65-F5344CB8AC3E}">
+        <p14:creationId xmlns:p14="http://schemas.microsoft.com/office/powerpoint/2010/main" val="1905949527"/>
       </p:ext>
     </p:extLst>
   </p:cSld>
@@ -783,29 +1728,69 @@
           <a:bodyPr/>
           <a:lstStyle/>
           <a:p>
-            <a:pPr marL="228600" indent="-228600">
-              <a:buAutoNum type="arabicPeriod"/>
-            </a:pPr>
             <a:r>
               <a:rPr lang="de-DE" dirty="0"/>
-              <a:t>Pointer zu variable von typ type, </a:t>
+              <a:t>-</a:t>
             </a:r>
             <a:r>
               <a:rPr lang="de-DE" dirty="0" err="1"/>
-              <a:t>pointer</a:t>
+              <a:t>Hanging</a:t>
             </a:r>
             <a:r>
               <a:rPr lang="de-DE" dirty="0"/>
-              <a:t> ans ende der variable</a:t>
-            </a:r>
-          </a:p>
-          <a:p>
-            <a:pPr marL="228600" indent="-228600">
-              <a:buAutoNum type="arabicPeriod"/>
-            </a:pPr>
+              <a:t> Pointer</a:t>
+            </a:r>
+          </a:p>
+          <a:p>
             <a:r>
               <a:rPr lang="de-DE" dirty="0"/>
-              <a:t>Schnelle inverse Wurzel (Wurde im Spiel Quake 3 verwendet)</a:t>
+              <a:t>-Memory </a:t>
+            </a:r>
+            <a:r>
+              <a:rPr lang="de-DE" dirty="0" err="1"/>
+              <a:t>Leak</a:t>
+            </a:r>
+            <a:endParaRPr lang="de-DE" dirty="0"/>
+          </a:p>
+          <a:p>
+            <a:r>
+              <a:rPr lang="de-DE" dirty="0"/>
+              <a:t>-impliziertes </a:t>
+            </a:r>
+            <a:r>
+              <a:rPr lang="de-DE" dirty="0" err="1"/>
+              <a:t>casten</a:t>
+            </a:r>
+            <a:endParaRPr lang="de-DE" dirty="0"/>
+          </a:p>
+          <a:p>
+            <a:r>
+              <a:rPr lang="de-DE" dirty="0"/>
+              <a:t>-keine </a:t>
+            </a:r>
+            <a:r>
+              <a:rPr lang="de-DE" dirty="0" err="1"/>
+              <a:t>übeprüfung</a:t>
+            </a:r>
+            <a:r>
+              <a:rPr lang="de-DE" dirty="0"/>
+              <a:t> ob auf </a:t>
+            </a:r>
+            <a:r>
+              <a:rPr lang="de-DE" dirty="0" err="1"/>
+              <a:t>größe</a:t>
+            </a:r>
+            <a:r>
+              <a:rPr lang="de-DE" dirty="0"/>
+              <a:t> von </a:t>
+            </a:r>
+            <a:r>
+              <a:rPr lang="de-DE" dirty="0" err="1"/>
+              <a:t>containern</a:t>
+            </a:r>
+            <a:r>
+              <a:rPr lang="de-DE" dirty="0"/>
+              <a:t> etc.</a:t>
             </a:r>
           </a:p>
         </p:txBody>
@@ -827,7 +1812,7 @@
           <a:p>
             <a:fld id="{A36B5070-147E-453A-9D66-845762D79ED0}" type="slidenum">
               <a:rPr lang="de-DE" smtClean="0"/>
-              <a:t>4</a:t>
+              <a:t>3</a:t>
             </a:fld>
             <a:endParaRPr lang="de-DE"/>
           </a:p>
@@ -836,7 +1821,7 @@
     </p:spTree>
     <p:extLst>
       <p:ext uri="{BB962C8B-B14F-4D97-AF65-F5344CB8AC3E}">
-        <p14:creationId xmlns:p14="http://schemas.microsoft.com/office/powerpoint/2010/main" val="246179751"/>
+        <p14:creationId xmlns:p14="http://schemas.microsoft.com/office/powerpoint/2010/main" val="2776674935"/>
       </p:ext>
     </p:extLst>
   </p:cSld>
@@ -890,87 +1875,29 @@
           <a:bodyPr/>
           <a:lstStyle/>
           <a:p>
-            <a:pPr marL="171450" indent="-171450">
-              <a:buFontTx/>
-              <a:buChar char="-"/>
+            <a:pPr marL="228600" indent="-228600">
+              <a:buAutoNum type="arabicPeriod"/>
             </a:pPr>
             <a:r>
               <a:rPr lang="de-DE" dirty="0"/>
-              <a:t>C++ ist hat grade durch seine Vielzahl an Bibliotheken Vorteile</a:t>
-            </a:r>
-          </a:p>
-          <a:p>
-            <a:pPr marL="171450" indent="-171450">
-              <a:buFontTx/>
-              <a:buChar char="-"/>
+              <a:t>Pointer zu variable von typ type, </a:t>
+            </a:r>
+            <a:r>
+              <a:rPr lang="de-DE" dirty="0" err="1"/>
+              <a:t>pointer</a:t>
+            </a:r>
+            <a:r>
+              <a:rPr lang="de-DE" dirty="0"/>
+              <a:t> ans ende der variable</a:t>
+            </a:r>
+          </a:p>
+          <a:p>
+            <a:pPr marL="228600" indent="-228600">
+              <a:buAutoNum type="arabicPeriod"/>
             </a:pPr>
             <a:r>
-              <a:rPr lang="de-DE" dirty="0" err="1"/>
-              <a:t>Boost</a:t>
-            </a:r>
-            <a:r>
               <a:rPr lang="de-DE" dirty="0"/>
-              <a:t> für:</a:t>
-            </a:r>
-          </a:p>
-          <a:p>
-            <a:pPr marL="628650" lvl="1" indent="-171450">
-              <a:buFontTx/>
-              <a:buChar char="-"/>
-            </a:pPr>
-            <a:r>
-              <a:rPr lang="de-DE" dirty="0"/>
-              <a:t>Funktionale Programmierung</a:t>
-            </a:r>
-          </a:p>
-          <a:p>
-            <a:pPr marL="628650" lvl="1" indent="-171450">
-              <a:buFontTx/>
-              <a:buChar char="-"/>
-            </a:pPr>
-            <a:r>
-              <a:rPr lang="de-DE" dirty="0"/>
-              <a:t>Datenstrukturen</a:t>
-            </a:r>
-          </a:p>
-          <a:p>
-            <a:pPr marL="628650" lvl="1" indent="-171450">
-              <a:buFontTx/>
-              <a:buChar char="-"/>
-            </a:pPr>
-            <a:r>
-              <a:rPr lang="de-DE" dirty="0"/>
-              <a:t>Algorithmen</a:t>
-            </a:r>
-          </a:p>
-          <a:p>
-            <a:pPr marL="628650" lvl="1" indent="-171450">
-              <a:buFontTx/>
-              <a:buChar char="-"/>
-            </a:pPr>
-            <a:r>
-              <a:rPr lang="de-DE" dirty="0"/>
-              <a:t>Zeitangaben</a:t>
-            </a:r>
-          </a:p>
-          <a:p>
-            <a:pPr marL="628650" lvl="1" indent="-171450">
-              <a:buFontTx/>
-              <a:buChar char="-"/>
-            </a:pPr>
-            <a:r>
-              <a:rPr lang="de-DE" dirty="0"/>
-              <a:t>Generische Programmierung</a:t>
-            </a:r>
-          </a:p>
-          <a:p>
-            <a:pPr marL="628650" lvl="1" indent="-171450">
-              <a:buFontTx/>
-              <a:buChar char="-"/>
-            </a:pPr>
-            <a:r>
-              <a:rPr lang="de-DE" dirty="0"/>
-              <a:t>Etc.</a:t>
+              <a:t>Schnelle inverse Wurzel (Wurde im Spiel Quake 3 verwendet)</a:t>
             </a:r>
           </a:p>
         </p:txBody>
@@ -992,7 +1919,7 @@
           <a:p>
             <a:fld id="{A36B5070-147E-453A-9D66-845762D79ED0}" type="slidenum">
               <a:rPr lang="de-DE" smtClean="0"/>
-              <a:t>5</a:t>
+              <a:t>4</a:t>
             </a:fld>
             <a:endParaRPr lang="de-DE"/>
           </a:p>
@@ -1001,7 +1928,7 @@
     </p:spTree>
     <p:extLst>
       <p:ext uri="{BB962C8B-B14F-4D97-AF65-F5344CB8AC3E}">
-        <p14:creationId xmlns:p14="http://schemas.microsoft.com/office/powerpoint/2010/main" val="122863904"/>
+        <p14:creationId xmlns:p14="http://schemas.microsoft.com/office/powerpoint/2010/main" val="246179751"/>
       </p:ext>
     </p:extLst>
   </p:cSld>
@@ -1055,7 +1982,88 @@
           <a:bodyPr/>
           <a:lstStyle/>
           <a:p>
-            <a:endParaRPr lang="de-DE"/>
+            <a:pPr marL="171450" indent="-171450">
+              <a:buFontTx/>
+              <a:buChar char="-"/>
+            </a:pPr>
+            <a:r>
+              <a:rPr lang="de-DE" dirty="0"/>
+              <a:t>C++ ist hat grade durch seine Vielzahl an Bibliotheken Vorteile</a:t>
+            </a:r>
+          </a:p>
+          <a:p>
+            <a:pPr marL="171450" indent="-171450">
+              <a:buFontTx/>
+              <a:buChar char="-"/>
+            </a:pPr>
+            <a:r>
+              <a:rPr lang="de-DE" dirty="0" err="1"/>
+              <a:t>Boost</a:t>
+            </a:r>
+            <a:r>
+              <a:rPr lang="de-DE" dirty="0"/>
+              <a:t> für:</a:t>
+            </a:r>
+          </a:p>
+          <a:p>
+            <a:pPr marL="628650" lvl="1" indent="-171450">
+              <a:buFontTx/>
+              <a:buChar char="-"/>
+            </a:pPr>
+            <a:r>
+              <a:rPr lang="de-DE" dirty="0"/>
+              <a:t>Funktionale Programmierung</a:t>
+            </a:r>
+          </a:p>
+          <a:p>
+            <a:pPr marL="628650" lvl="1" indent="-171450">
+              <a:buFontTx/>
+              <a:buChar char="-"/>
+            </a:pPr>
+            <a:r>
+              <a:rPr lang="de-DE" dirty="0"/>
+              <a:t>Datenstrukturen</a:t>
+            </a:r>
+          </a:p>
+          <a:p>
+            <a:pPr marL="628650" lvl="1" indent="-171450">
+              <a:buFontTx/>
+              <a:buChar char="-"/>
+            </a:pPr>
+            <a:r>
+              <a:rPr lang="de-DE" dirty="0"/>
+              <a:t>Algorithmen</a:t>
+            </a:r>
+          </a:p>
+          <a:p>
+            <a:pPr marL="628650" lvl="1" indent="-171450">
+              <a:buFontTx/>
+              <a:buChar char="-"/>
+            </a:pPr>
+            <a:r>
+              <a:rPr lang="de-DE" dirty="0"/>
+              <a:t>Zeitangaben</a:t>
+            </a:r>
+          </a:p>
+          <a:p>
+            <a:pPr marL="628650" lvl="1" indent="-171450">
+              <a:buFontTx/>
+              <a:buChar char="-"/>
+            </a:pPr>
+            <a:r>
+              <a:rPr lang="de-DE" dirty="0"/>
+              <a:t>Generische Programmierung</a:t>
+            </a:r>
+          </a:p>
+          <a:p>
+            <a:pPr marL="628650" lvl="1" indent="-171450">
+              <a:buFontTx/>
+              <a:buChar char="-"/>
+            </a:pPr>
+            <a:r>
+              <a:rPr lang="de-DE" dirty="0"/>
+              <a:t>Etc.</a:t>
+            </a:r>
           </a:p>
         </p:txBody>
       </p:sp>
@@ -1076,7 +2084,7 @@
           <a:p>
             <a:fld id="{A36B5070-147E-453A-9D66-845762D79ED0}" type="slidenum">
               <a:rPr lang="de-DE" smtClean="0"/>
-              <a:t>6</a:t>
+              <a:t>5</a:t>
             </a:fld>
             <a:endParaRPr lang="de-DE"/>
           </a:p>
@@ -1085,7 +2093,7 @@
     </p:spTree>
     <p:extLst>
       <p:ext uri="{BB962C8B-B14F-4D97-AF65-F5344CB8AC3E}">
-        <p14:creationId xmlns:p14="http://schemas.microsoft.com/office/powerpoint/2010/main" val="566822859"/>
+        <p14:creationId xmlns:p14="http://schemas.microsoft.com/office/powerpoint/2010/main" val="122863904"/>
       </p:ext>
     </p:extLst>
   </p:cSld>
@@ -1139,7 +2147,7 @@
           <a:bodyPr/>
           <a:lstStyle/>
           <a:p>
-            <a:endParaRPr lang="de-DE"/>
+            <a:endParaRPr lang="de-DE" dirty="0"/>
           </a:p>
         </p:txBody>
       </p:sp>
@@ -1160,7 +2168,7 @@
           <a:p>
             <a:fld id="{A36B5070-147E-453A-9D66-845762D79ED0}" type="slidenum">
               <a:rPr lang="de-DE" smtClean="0"/>
-              <a:t>7</a:t>
+              <a:t>6</a:t>
             </a:fld>
             <a:endParaRPr lang="de-DE"/>
           </a:p>
@@ -1169,7 +2177,7 @@
     </p:spTree>
     <p:extLst>
       <p:ext uri="{BB962C8B-B14F-4D97-AF65-F5344CB8AC3E}">
-        <p14:creationId xmlns:p14="http://schemas.microsoft.com/office/powerpoint/2010/main" val="3209384201"/>
+        <p14:creationId xmlns:p14="http://schemas.microsoft.com/office/powerpoint/2010/main" val="566822859"/>
       </p:ext>
     </p:extLst>
   </p:cSld>
@@ -1223,7 +2231,59 @@
           <a:bodyPr/>
           <a:lstStyle/>
           <a:p>
-            <a:endParaRPr lang="de-DE"/>
+            <a:r>
+              <a:rPr lang="de-DE" dirty="0"/>
+              <a:t>-spezielle </a:t>
+            </a:r>
+            <a:r>
+              <a:rPr lang="de-DE" dirty="0" err="1"/>
+              <a:t>Interruptionpoints</a:t>
+            </a:r>
+            <a:r>
+              <a:rPr lang="de-DE" dirty="0"/>
+              <a:t> möglich</a:t>
+            </a:r>
+          </a:p>
+          <a:p>
+            <a:r>
+              <a:rPr lang="de-DE" dirty="0"/>
+              <a:t>-(</a:t>
+            </a:r>
+            <a:r>
+              <a:rPr lang="de-DE" dirty="0" err="1"/>
+              <a:t>wait</a:t>
+            </a:r>
+            <a:r>
+              <a:rPr lang="de-DE" dirty="0"/>
+              <a:t> </a:t>
+            </a:r>
+            <a:r>
+              <a:rPr lang="de-DE" dirty="0" err="1"/>
+              <a:t>funktiniert</a:t>
+            </a:r>
+            <a:r>
+              <a:rPr lang="de-DE" dirty="0"/>
+              <a:t> mit </a:t>
+            </a:r>
+            <a:r>
+              <a:rPr lang="de-DE" dirty="0" err="1"/>
+              <a:t>boost</a:t>
+            </a:r>
+            <a:r>
+              <a:rPr lang="de-DE" dirty="0"/>
+              <a:t>::</a:t>
+            </a:r>
+            <a:r>
+              <a:rPr lang="de-DE" dirty="0" err="1"/>
+              <a:t>chrono</a:t>
+            </a:r>
+            <a:r>
+              <a:rPr lang="de-DE" dirty="0"/>
+              <a:t>)</a:t>
+            </a:r>
+          </a:p>
+          <a:p>
+            <a:endParaRPr lang="de-DE" dirty="0"/>
           </a:p>
         </p:txBody>
       </p:sp>
@@ -1244,6 +2304,90 @@
           <a:p>
             <a:fld id="{A36B5070-147E-453A-9D66-845762D79ED0}" type="slidenum">
               <a:rPr lang="de-DE" smtClean="0"/>
+              <a:t>7</a:t>
+            </a:fld>
+            <a:endParaRPr lang="de-DE"/>
+          </a:p>
+        </p:txBody>
+      </p:sp>
+    </p:spTree>
+    <p:extLst>
+      <p:ext uri="{BB962C8B-B14F-4D97-AF65-F5344CB8AC3E}">
+        <p14:creationId xmlns:p14="http://schemas.microsoft.com/office/powerpoint/2010/main" val="3209384201"/>
+      </p:ext>
+    </p:extLst>
+  </p:cSld>
+  <p:clrMapOvr>
+    <a:masterClrMapping/>
+  </p:clrMapOvr>
+</p:notes>
+</file>
+
+<file path=ppt/notesSlides/notesSlide8.xml><?xml version="1.0" encoding="utf-8"?>
+<p:notes xmlns:a="http://schemas.openxmlformats.org/drawingml/2006/main" xmlns:r="http://schemas.openxmlformats.org/officeDocument/2006/relationships" xmlns:p="http://schemas.openxmlformats.org/presentationml/2006/main">
+  <p:cSld>
+    <p:spTree>
+      <p:nvGrpSpPr>
+        <p:cNvPr id="1" name=""/>
+        <p:cNvGrpSpPr/>
+        <p:nvPr/>
+      </p:nvGrpSpPr>
+      <p:grpSpPr>
+        <a:xfrm>
+          <a:off x="0" y="0"/>
+          <a:ext cx="0" cy="0"/>
+          <a:chOff x="0" y="0"/>
+          <a:chExt cx="0" cy="0"/>
+        </a:xfrm>
+      </p:grpSpPr>
+      <p:sp>
+        <p:nvSpPr>
+          <p:cNvPr id="2" name="Folienbildplatzhalter 1"/>
+          <p:cNvSpPr>
+            <a:spLocks noGrp="1" noRot="1" noChangeAspect="1"/>
+          </p:cNvSpPr>
+          <p:nvPr>
+            <p:ph type="sldImg"/>
+          </p:nvPr>
+        </p:nvSpPr>
+        <p:spPr/>
+      </p:sp>
+      <p:sp>
+        <p:nvSpPr>
+          <p:cNvPr id="3" name="Notizenplatzhalter 2"/>
+          <p:cNvSpPr>
+            <a:spLocks noGrp="1"/>
+          </p:cNvSpPr>
+          <p:nvPr>
+            <p:ph type="body" idx="1"/>
+          </p:nvPr>
+        </p:nvSpPr>
+        <p:spPr/>
+        <p:txBody>
+          <a:bodyPr/>
+          <a:lstStyle/>
+          <a:p>
+            <a:endParaRPr lang="de-DE" dirty="0"/>
+          </a:p>
+        </p:txBody>
+      </p:sp>
+      <p:sp>
+        <p:nvSpPr>
+          <p:cNvPr id="4" name="Foliennummernplatzhalter 3"/>
+          <p:cNvSpPr>
+            <a:spLocks noGrp="1"/>
+          </p:cNvSpPr>
+          <p:nvPr>
+            <p:ph type="sldNum" sz="quarter" idx="10"/>
+          </p:nvPr>
+        </p:nvSpPr>
+        <p:spPr/>
+        <p:txBody>
+          <a:bodyPr/>
+          <a:lstStyle/>
+          <a:p>
+            <a:fld id="{A36B5070-147E-453A-9D66-845762D79ED0}" type="slidenum">
+              <a:rPr lang="de-DE" smtClean="0"/>
               <a:t>8</a:t>
             </a:fld>
             <a:endParaRPr lang="de-DE"/>
@@ -1254,6 +2398,90 @@
     <p:extLst>
       <p:ext uri="{BB962C8B-B14F-4D97-AF65-F5344CB8AC3E}">
         <p14:creationId xmlns:p14="http://schemas.microsoft.com/office/powerpoint/2010/main" val="1242752347"/>
+      </p:ext>
+    </p:extLst>
+  </p:cSld>
+  <p:clrMapOvr>
+    <a:masterClrMapping/>
+  </p:clrMapOvr>
+</p:notes>
+</file>
+
+<file path=ppt/notesSlides/notesSlide9.xml><?xml version="1.0" encoding="utf-8"?>
+<p:notes xmlns:a="http://schemas.openxmlformats.org/drawingml/2006/main" xmlns:r="http://schemas.openxmlformats.org/officeDocument/2006/relationships" xmlns:p="http://schemas.openxmlformats.org/presentationml/2006/main">
+  <p:cSld>
+    <p:spTree>
+      <p:nvGrpSpPr>
+        <p:cNvPr id="1" name=""/>
+        <p:cNvGrpSpPr/>
+        <p:nvPr/>
+      </p:nvGrpSpPr>
+      <p:grpSpPr>
+        <a:xfrm>
+          <a:off x="0" y="0"/>
+          <a:ext cx="0" cy="0"/>
+          <a:chOff x="0" y="0"/>
+          <a:chExt cx="0" cy="0"/>
+        </a:xfrm>
+      </p:grpSpPr>
+      <p:sp>
+        <p:nvSpPr>
+          <p:cNvPr id="2" name="Folienbildplatzhalter 1"/>
+          <p:cNvSpPr>
+            <a:spLocks noGrp="1" noRot="1" noChangeAspect="1"/>
+          </p:cNvSpPr>
+          <p:nvPr>
+            <p:ph type="sldImg"/>
+          </p:nvPr>
+        </p:nvSpPr>
+        <p:spPr/>
+      </p:sp>
+      <p:sp>
+        <p:nvSpPr>
+          <p:cNvPr id="3" name="Notizenplatzhalter 2"/>
+          <p:cNvSpPr>
+            <a:spLocks noGrp="1"/>
+          </p:cNvSpPr>
+          <p:nvPr>
+            <p:ph type="body" idx="1"/>
+          </p:nvPr>
+        </p:nvSpPr>
+        <p:spPr/>
+        <p:txBody>
+          <a:bodyPr/>
+          <a:lstStyle/>
+          <a:p>
+            <a:endParaRPr lang="de-DE" dirty="0"/>
+          </a:p>
+        </p:txBody>
+      </p:sp>
+      <p:sp>
+        <p:nvSpPr>
+          <p:cNvPr id="4" name="Foliennummernplatzhalter 3"/>
+          <p:cNvSpPr>
+            <a:spLocks noGrp="1"/>
+          </p:cNvSpPr>
+          <p:nvPr>
+            <p:ph type="sldNum" sz="quarter" idx="10"/>
+          </p:nvPr>
+        </p:nvSpPr>
+        <p:spPr/>
+        <p:txBody>
+          <a:bodyPr/>
+          <a:lstStyle/>
+          <a:p>
+            <a:fld id="{A36B5070-147E-453A-9D66-845762D79ED0}" type="slidenum">
+              <a:rPr lang="de-DE" smtClean="0"/>
+              <a:t>9</a:t>
+            </a:fld>
+            <a:endParaRPr lang="de-DE"/>
+          </a:p>
+        </p:txBody>
+      </p:sp>
+    </p:spTree>
+    <p:extLst>
+      <p:ext uri="{BB962C8B-B14F-4D97-AF65-F5344CB8AC3E}">
+        <p14:creationId xmlns:p14="http://schemas.microsoft.com/office/powerpoint/2010/main" val="871682274"/>
       </p:ext>
     </p:extLst>
   </p:cSld>
@@ -7278,7 +8506,7 @@
           </p:nvPr>
         </p:nvPicPr>
         <p:blipFill>
-          <a:blip r:embed="rId3">
+          <a:blip r:embed="rId4">
             <a:extLst>
               <a:ext uri="{28A0092B-C50C-407E-A947-70E740481C1C}">
                 <a14:useLocalDpi xmlns:a14="http://schemas.microsoft.com/office/drawing/2010/main" val="0"/>
@@ -7309,7 +8537,7 @@
           </p:nvPr>
         </p:nvPicPr>
         <p:blipFill>
-          <a:blip r:embed="rId4" cstate="print">
+          <a:blip r:embed="rId5" cstate="print">
             <a:extLst>
               <a:ext uri="{28A0092B-C50C-407E-A947-70E740481C1C}">
                 <a14:useLocalDpi xmlns:a14="http://schemas.microsoft.com/office/drawing/2010/main" val="0"/>
@@ -7350,7 +8578,7 @@
           <p:nvPr/>
         </p:nvPicPr>
         <p:blipFill>
-          <a:blip r:embed="rId5">
+          <a:blip r:embed="rId6">
             <a:extLst>
               <a:ext uri="{28A0092B-C50C-407E-A947-70E740481C1C}">
                 <a14:useLocalDpi xmlns:a14="http://schemas.microsoft.com/office/drawing/2010/main" val="0"/>
@@ -7455,7 +8683,7 @@
           <p:nvPr/>
         </p:nvPicPr>
         <p:blipFill>
-          <a:blip r:embed="rId6">
+          <a:blip r:embed="rId7">
             <a:extLst>
               <a:ext uri="{28A0092B-C50C-407E-A947-70E740481C1C}">
                 <a14:useLocalDpi xmlns:a14="http://schemas.microsoft.com/office/drawing/2010/main" val="0"/>
@@ -7672,8 +8900,8 @@
         </p:nvSpPr>
         <p:spPr>
           <a:xfrm>
-            <a:off x="4777066" y="5460113"/>
-            <a:ext cx="6200214" cy="830997"/>
+            <a:off x="4842126" y="5384451"/>
+            <a:ext cx="6200214" cy="461665"/>
           </a:xfrm>
           <a:prstGeom prst="rect">
             <a:avLst/>
@@ -7705,57 +8933,12 @@
                 <a:latin typeface="Courier New" panose="02070309020205020404" pitchFamily="49" charset="0"/>
                 <a:cs typeface="Courier New" panose="02070309020205020404" pitchFamily="49" charset="0"/>
               </a:rPr>
-              <a:t>unique_lock</a:t>
-            </a:r>
-            <a:r>
-              <a:rPr lang="de-DE" sz="2400" dirty="0">
-                <a:latin typeface="Courier New" panose="02070309020205020404" pitchFamily="49" charset="0"/>
-                <a:cs typeface="Courier New" panose="02070309020205020404" pitchFamily="49" charset="0"/>
-              </a:rPr>
-              <a:t>&lt;</a:t>
-            </a:r>
-            <a:r>
-              <a:rPr lang="de-DE" sz="2400" dirty="0" err="1">
-                <a:latin typeface="Courier New" panose="02070309020205020404" pitchFamily="49" charset="0"/>
-                <a:cs typeface="Courier New" panose="02070309020205020404" pitchFamily="49" charset="0"/>
-              </a:rPr>
-              <a:t>boost</a:t>
-            </a:r>
-            <a:r>
-              <a:rPr lang="de-DE" sz="2400" dirty="0">
-                <a:latin typeface="Courier New" panose="02070309020205020404" pitchFamily="49" charset="0"/>
-                <a:cs typeface="Courier New" panose="02070309020205020404" pitchFamily="49" charset="0"/>
-              </a:rPr>
-              <a:t>::</a:t>
-            </a:r>
-            <a:r>
-              <a:rPr lang="de-DE" sz="2400" dirty="0" err="1">
-                <a:latin typeface="Courier New" panose="02070309020205020404" pitchFamily="49" charset="0"/>
-                <a:cs typeface="Courier New" panose="02070309020205020404" pitchFamily="49" charset="0"/>
-              </a:rPr>
               <a:t>shared_mutex</a:t>
             </a:r>
-            <a:r>
-              <a:rPr lang="de-DE" sz="2400" dirty="0">
-                <a:latin typeface="Courier New" panose="02070309020205020404" pitchFamily="49" charset="0"/>
-                <a:cs typeface="Courier New" panose="02070309020205020404" pitchFamily="49" charset="0"/>
-              </a:rPr>
-              <a:t>&gt; lock{</a:t>
-            </a:r>
-            <a:r>
-              <a:rPr lang="de-DE" sz="2400" dirty="0" err="1">
-                <a:latin typeface="Courier New" panose="02070309020205020404" pitchFamily="49" charset="0"/>
-                <a:cs typeface="Courier New" panose="02070309020205020404" pitchFamily="49" charset="0"/>
-              </a:rPr>
-              <a:t>mutex</a:t>
-            </a:r>
-            <a:r>
-              <a:rPr lang="de-DE" sz="2400" dirty="0">
-                <a:latin typeface="Courier New" panose="02070309020205020404" pitchFamily="49" charset="0"/>
-                <a:cs typeface="Courier New" panose="02070309020205020404" pitchFamily="49" charset="0"/>
-              </a:rPr>
-              <a:t>};</a:t>
-            </a:r>
+            <a:endParaRPr lang="de-DE" sz="2400" dirty="0">
+              <a:latin typeface="Courier New" panose="02070309020205020404" pitchFamily="49" charset="0"/>
+              <a:cs typeface="Courier New" panose="02070309020205020404" pitchFamily="49" charset="0"/>
+            </a:endParaRPr>
           </a:p>
         </p:txBody>
       </p:sp>
@@ -9242,7 +10425,7 @@
 </file>
 
 <file path=ppt/slides/slide14.xml><?xml version="1.0" encoding="utf-8"?>
-<p:sld xmlns:a="http://schemas.openxmlformats.org/drawingml/2006/main" xmlns:r="http://schemas.openxmlformats.org/officeDocument/2006/relationships" xmlns:p="http://schemas.openxmlformats.org/presentationml/2006/main">
+<p:sld xmlns:a="http://schemas.openxmlformats.org/drawingml/2006/main" xmlns:r="http://schemas.openxmlformats.org/officeDocument/2006/relationships" xmlns:p="http://schemas.openxmlformats.org/presentationml/2006/main" show="0">
   <p:cSld>
     <p:spTree>
       <p:nvGrpSpPr>
@@ -11032,7 +12215,7 @@
           </p:nvPr>
         </p:nvPicPr>
         <p:blipFill>
-          <a:blip r:embed="rId3">
+          <a:blip r:embed="rId4">
             <a:extLst>
               <a:ext uri="{28A0092B-C50C-407E-A947-70E740481C1C}">
                 <a14:useLocalDpi xmlns:a14="http://schemas.microsoft.com/office/drawing/2010/main" val="0"/>
@@ -11063,7 +12246,7 @@
           </p:nvPr>
         </p:nvPicPr>
         <p:blipFill rotWithShape="1">
-          <a:blip r:embed="rId4" cstate="print">
+          <a:blip r:embed="rId5" cstate="print">
             <a:extLst>
               <a:ext uri="{28A0092B-C50C-407E-A947-70E740481C1C}">
                 <a14:useLocalDpi xmlns:a14="http://schemas.microsoft.com/office/drawing/2010/main" val="0"/>
@@ -11102,7 +12285,7 @@
           <p:nvPr/>
         </p:nvPicPr>
         <p:blipFill>
-          <a:blip r:embed="rId5">
+          <a:blip r:embed="rId6">
             <a:extLst>
               <a:ext uri="{28A0092B-C50C-407E-A947-70E740481C1C}">
                 <a14:useLocalDpi xmlns:a14="http://schemas.microsoft.com/office/drawing/2010/main" val="0"/>
@@ -11132,7 +12315,7 @@
           <p:nvPr/>
         </p:nvPicPr>
         <p:blipFill>
-          <a:blip r:embed="rId6">
+          <a:blip r:embed="rId7">
             <a:extLst>
               <a:ext uri="{28A0092B-C50C-407E-A947-70E740481C1C}">
                 <a14:useLocalDpi xmlns:a14="http://schemas.microsoft.com/office/drawing/2010/main" val="0"/>
@@ -11270,7 +12453,7 @@
           <p:nvPr/>
         </p:nvPicPr>
         <p:blipFill>
-          <a:blip r:embed="rId7">
+          <a:blip r:embed="rId8">
             <a:extLst>
               <a:ext uri="{28A0092B-C50C-407E-A947-70E740481C1C}">
                 <a14:useLocalDpi xmlns:a14="http://schemas.microsoft.com/office/drawing/2010/main" val="0"/>
@@ -11757,7 +12940,7 @@
           </p:nvPr>
         </p:nvPicPr>
         <p:blipFill>
-          <a:blip r:embed="rId6">
+          <a:blip r:embed="rId7">
             <a:extLst>
               <a:ext uri="{28A0092B-C50C-407E-A947-70E740481C1C}">
                 <a14:useLocalDpi xmlns:a14="http://schemas.microsoft.com/office/drawing/2010/main" val="0"/>
@@ -11788,7 +12971,7 @@
           </p:nvPr>
         </p:nvPicPr>
         <p:blipFill rotWithShape="1">
-          <a:blip r:embed="rId7" cstate="print">
+          <a:blip r:embed="rId8" cstate="print">
             <a:extLst>
               <a:ext uri="{28A0092B-C50C-407E-A947-70E740481C1C}">
                 <a14:useLocalDpi xmlns:a14="http://schemas.microsoft.com/office/drawing/2010/main" val="0"/>
@@ -11827,7 +13010,7 @@
           <p:nvPr/>
         </p:nvPicPr>
         <p:blipFill>
-          <a:blip r:embed="rId8">
+          <a:blip r:embed="rId9">
             <a:extLst>
               <a:ext uri="{28A0092B-C50C-407E-A947-70E740481C1C}">
                 <a14:useLocalDpi xmlns:a14="http://schemas.microsoft.com/office/drawing/2010/main" val="0"/>
@@ -11857,7 +13040,7 @@
           <p:nvPr/>
         </p:nvPicPr>
         <p:blipFill>
-          <a:blip r:embed="rId9">
+          <a:blip r:embed="rId10">
             <a:extLst>
               <a:ext uri="{28A0092B-C50C-407E-A947-70E740481C1C}">
                 <a14:useLocalDpi xmlns:a14="http://schemas.microsoft.com/office/drawing/2010/main" val="0"/>
@@ -11999,7 +13182,7 @@
           </p:nvPr>
         </p:nvPicPr>
         <p:blipFill>
-          <a:blip r:embed="rId10" cstate="print">
+          <a:blip r:embed="rId11" cstate="print">
             <a:extLst>
               <a:ext uri="{28A0092B-C50C-407E-A947-70E740481C1C}">
                 <a14:useLocalDpi xmlns:a14="http://schemas.microsoft.com/office/drawing/2010/main" val="0"/>
@@ -12044,7 +13227,7 @@
           </p:nvPr>
         </p:nvPicPr>
         <p:blipFill>
-          <a:blip r:embed="rId11" cstate="print">
+          <a:blip r:embed="rId12" cstate="print">
             <a:extLst>
               <a:ext uri="{28A0092B-C50C-407E-A947-70E740481C1C}">
                 <a14:useLocalDpi xmlns:a14="http://schemas.microsoft.com/office/drawing/2010/main" val="0"/>
@@ -12078,7 +13261,7 @@
           </p:nvPr>
         </p:nvPicPr>
         <p:blipFill>
-          <a:blip r:embed="rId10" cstate="print">
+          <a:blip r:embed="rId11" cstate="print">
             <a:extLst>
               <a:ext uri="{28A0092B-C50C-407E-A947-70E740481C1C}">
                 <a14:useLocalDpi xmlns:a14="http://schemas.microsoft.com/office/drawing/2010/main" val="0"/>
@@ -13002,7 +14185,7 @@
           </p:nvPr>
         </p:nvPicPr>
         <p:blipFill>
-          <a:blip r:embed="rId3">
+          <a:blip r:embed="rId4">
             <a:extLst>
               <a:ext uri="{28A0092B-C50C-407E-A947-70E740481C1C}">
                 <a14:useLocalDpi xmlns:a14="http://schemas.microsoft.com/office/drawing/2010/main" val="0"/>
@@ -13029,7 +14212,7 @@
           <p:nvPr/>
         </p:nvPicPr>
         <p:blipFill>
-          <a:blip r:embed="rId4">
+          <a:blip r:embed="rId5">
             <a:extLst>
               <a:ext uri="{28A0092B-C50C-407E-A947-70E740481C1C}">
                 <a14:useLocalDpi xmlns:a14="http://schemas.microsoft.com/office/drawing/2010/main" val="0"/>
@@ -13122,7 +14305,7 @@
           </p:nvPr>
         </p:nvPicPr>
         <p:blipFill>
-          <a:blip r:embed="rId5" cstate="print">
+          <a:blip r:embed="rId6" cstate="print">
             <a:extLst>
               <a:ext uri="{28A0092B-C50C-407E-A947-70E740481C1C}">
                 <a14:useLocalDpi xmlns:a14="http://schemas.microsoft.com/office/drawing/2010/main" val="0"/>
@@ -15501,7 +16684,9 @@
         </p:nvSpPr>
         <p:spPr/>
         <p:txBody>
-          <a:bodyPr/>
+          <a:bodyPr>
+            <a:normAutofit/>
+          </a:bodyPr>
           <a:lstStyle/>
           <a:p>
             <a:pPr marL="0" indent="0" algn="ctr">
@@ -15528,6 +16713,21 @@
             <a:r>
               <a:rPr lang="de-DE" sz="4800" dirty="0"/>
               <a:t>Demo Zeit!</a:t>
+            </a:r>
+          </a:p>
+          <a:p>
+            <a:pPr marL="0" indent="0" algn="ctr">
+              <a:buNone/>
+            </a:pPr>
+            <a:endParaRPr lang="de-DE" sz="4800" dirty="0"/>
+          </a:p>
+          <a:p>
+            <a:pPr marL="0" indent="0" algn="ctr">
+              <a:buNone/>
+            </a:pPr>
+            <a:r>
+              <a:rPr lang="de-DE" sz="3500" dirty="0"/>
+              <a:t>Repository: https://github.com/Goriar/ws16-17_santa</a:t>
             </a:r>
           </a:p>
         </p:txBody>

</xml_diff>